<commit_message>
add a motivational picture
</commit_message>
<xml_diff>
--- a/docs/motivation.pptx
+++ b/docs/motivation.pptx
@@ -4099,14 +4099,14 @@
           <a:bodyPr rtlCol="0" anchor="ctr"/>
           <a:lstStyle/>
           <a:p>
-            <a:pPr algn="ctr"/>
+            <a:pPr algn="r"/>
             <a:r>
               <a:rPr lang="en-US" dirty="0">
                 <a:solidFill>
                   <a:schemeClr val="accent1"/>
                 </a:solidFill>
               </a:rPr>
-              <a:t>track</a:t>
+              <a:t>analyze</a:t>
             </a:r>
           </a:p>
         </p:txBody>
@@ -5066,7 +5066,7 @@
         </p:blipFill>
         <p:spPr>
           <a:xfrm>
-            <a:off x="6115028" y="2490441"/>
+            <a:off x="6150830" y="2498944"/>
             <a:ext cx="392045" cy="392045"/>
           </a:xfrm>
           <a:prstGeom prst="rect">

</xml_diff>

<commit_message>
event_base64 maybe a file path now
</commit_message>
<xml_diff>
--- a/docs/motivation.pptx
+++ b/docs/motivation.pptx
@@ -261,7 +261,7 @@
           <a:p>
             <a:fld id="{0864BC37-BAC7-4038-A15D-F28C514F8D32}" type="datetimeFigureOut">
               <a:rPr lang="en-US" smtClean="0"/>
-              <a:t>11/10/2022</a:t>
+              <a:t>11/16/2022</a:t>
             </a:fld>
             <a:endParaRPr lang="en-US" dirty="0"/>
           </a:p>
@@ -461,7 +461,7 @@
           <a:p>
             <a:fld id="{0864BC37-BAC7-4038-A15D-F28C514F8D32}" type="datetimeFigureOut">
               <a:rPr lang="en-US" smtClean="0"/>
-              <a:t>11/10/2022</a:t>
+              <a:t>11/16/2022</a:t>
             </a:fld>
             <a:endParaRPr lang="en-US" dirty="0"/>
           </a:p>
@@ -671,7 +671,7 @@
           <a:p>
             <a:fld id="{0864BC37-BAC7-4038-A15D-F28C514F8D32}" type="datetimeFigureOut">
               <a:rPr lang="en-US" smtClean="0"/>
-              <a:t>11/10/2022</a:t>
+              <a:t>11/16/2022</a:t>
             </a:fld>
             <a:endParaRPr lang="en-US" dirty="0"/>
           </a:p>
@@ -871,7 +871,7 @@
           <a:p>
             <a:fld id="{0864BC37-BAC7-4038-A15D-F28C514F8D32}" type="datetimeFigureOut">
               <a:rPr lang="en-US" smtClean="0"/>
-              <a:t>11/10/2022</a:t>
+              <a:t>11/16/2022</a:t>
             </a:fld>
             <a:endParaRPr lang="en-US" dirty="0"/>
           </a:p>
@@ -1147,7 +1147,7 @@
           <a:p>
             <a:fld id="{0864BC37-BAC7-4038-A15D-F28C514F8D32}" type="datetimeFigureOut">
               <a:rPr lang="en-US" smtClean="0"/>
-              <a:t>11/10/2022</a:t>
+              <a:t>11/16/2022</a:t>
             </a:fld>
             <a:endParaRPr lang="en-US" dirty="0"/>
           </a:p>
@@ -1415,7 +1415,7 @@
           <a:p>
             <a:fld id="{0864BC37-BAC7-4038-A15D-F28C514F8D32}" type="datetimeFigureOut">
               <a:rPr lang="en-US" smtClean="0"/>
-              <a:t>11/10/2022</a:t>
+              <a:t>11/16/2022</a:t>
             </a:fld>
             <a:endParaRPr lang="en-US" dirty="0"/>
           </a:p>
@@ -1830,7 +1830,7 @@
           <a:p>
             <a:fld id="{0864BC37-BAC7-4038-A15D-F28C514F8D32}" type="datetimeFigureOut">
               <a:rPr lang="en-US" smtClean="0"/>
-              <a:t>11/10/2022</a:t>
+              <a:t>11/16/2022</a:t>
             </a:fld>
             <a:endParaRPr lang="en-US" dirty="0"/>
           </a:p>
@@ -1972,7 +1972,7 @@
           <a:p>
             <a:fld id="{0864BC37-BAC7-4038-A15D-F28C514F8D32}" type="datetimeFigureOut">
               <a:rPr lang="en-US" smtClean="0"/>
-              <a:t>11/10/2022</a:t>
+              <a:t>11/16/2022</a:t>
             </a:fld>
             <a:endParaRPr lang="en-US" dirty="0"/>
           </a:p>
@@ -2085,7 +2085,7 @@
           <a:p>
             <a:fld id="{0864BC37-BAC7-4038-A15D-F28C514F8D32}" type="datetimeFigureOut">
               <a:rPr lang="en-US" smtClean="0"/>
-              <a:t>11/10/2022</a:t>
+              <a:t>11/16/2022</a:t>
             </a:fld>
             <a:endParaRPr lang="en-US" dirty="0"/>
           </a:p>
@@ -2398,7 +2398,7 @@
           <a:p>
             <a:fld id="{0864BC37-BAC7-4038-A15D-F28C514F8D32}" type="datetimeFigureOut">
               <a:rPr lang="en-US" smtClean="0"/>
-              <a:t>11/10/2022</a:t>
+              <a:t>11/16/2022</a:t>
             </a:fld>
             <a:endParaRPr lang="en-US" dirty="0"/>
           </a:p>
@@ -2687,7 +2687,7 @@
           <a:p>
             <a:fld id="{0864BC37-BAC7-4038-A15D-F28C514F8D32}" type="datetimeFigureOut">
               <a:rPr lang="en-US" smtClean="0"/>
-              <a:t>11/10/2022</a:t>
+              <a:t>11/16/2022</a:t>
             </a:fld>
             <a:endParaRPr lang="en-US" dirty="0"/>
           </a:p>
@@ -2930,7 +2930,7 @@
           <a:p>
             <a:fld id="{0864BC37-BAC7-4038-A15D-F28C514F8D32}" type="datetimeFigureOut">
               <a:rPr lang="en-US" smtClean="0"/>
-              <a:t>11/10/2022</a:t>
+              <a:t>11/16/2022</a:t>
             </a:fld>
             <a:endParaRPr lang="en-US" dirty="0"/>
           </a:p>
@@ -5612,12 +5612,48 @@
           </p:txBody>
         </p:sp>
       </p:grpSp>
+      <p:pic>
+        <p:nvPicPr>
+          <p:cNvPr id="269" name="Grafik 268">
+            <a:extLst>
+              <a:ext uri="{FF2B5EF4-FFF2-40B4-BE49-F238E27FC236}">
+                <a16:creationId xmlns:a16="http://schemas.microsoft.com/office/drawing/2014/main" id="{693A178B-4746-4B0A-9415-930C2D6F155F}"/>
+              </a:ext>
+            </a:extLst>
+          </p:cNvPr>
+          <p:cNvPicPr>
+            <a:picLocks noChangeAspect="1"/>
+          </p:cNvPicPr>
+          <p:nvPr/>
+        </p:nvPicPr>
+        <p:blipFill>
+          <a:blip r:embed="rId17">
+            <a:extLst>
+              <a:ext uri="{28A0092B-C50C-407E-A947-70E740481C1C}">
+                <a14:useLocalDpi xmlns:a14="http://schemas.microsoft.com/office/drawing/2010/main" val="0"/>
+              </a:ext>
+            </a:extLst>
+          </a:blip>
+          <a:stretch>
+            <a:fillRect/>
+          </a:stretch>
+        </p:blipFill>
+        <p:spPr>
+          <a:xfrm>
+            <a:off x="8525248" y="2238965"/>
+            <a:ext cx="266796" cy="266796"/>
+          </a:xfrm>
+          <a:prstGeom prst="rect">
+            <a:avLst/>
+          </a:prstGeom>
+        </p:spPr>
+      </p:pic>
       <p:grpSp>
         <p:nvGrpSpPr>
-          <p:cNvPr id="260" name="Gruppieren 259">
-            <a:extLst>
-              <a:ext uri="{FF2B5EF4-FFF2-40B4-BE49-F238E27FC236}">
-                <a16:creationId xmlns:a16="http://schemas.microsoft.com/office/drawing/2014/main" id="{CBE4D3B5-3171-4218-985A-45D582BEB944}"/>
+          <p:cNvPr id="14" name="Gruppieren 13">
+            <a:extLst>
+              <a:ext uri="{FF2B5EF4-FFF2-40B4-BE49-F238E27FC236}">
+                <a16:creationId xmlns:a16="http://schemas.microsoft.com/office/drawing/2014/main" id="{1E1076DD-A102-4FBF-A8C9-A3882AFB2AA4}"/>
               </a:ext>
             </a:extLst>
           </p:cNvPr>
@@ -5626,18 +5662,68 @@
         </p:nvGrpSpPr>
         <p:grpSpPr>
           <a:xfrm>
-            <a:off x="3438400" y="2026617"/>
-            <a:ext cx="1255758" cy="435284"/>
-            <a:chOff x="4996459" y="3908148"/>
-            <a:chExt cx="1255758" cy="435284"/>
+            <a:off x="3347157" y="1979870"/>
+            <a:ext cx="586568" cy="533257"/>
+            <a:chOff x="4196421" y="4931727"/>
+            <a:chExt cx="586568" cy="533257"/>
           </a:xfrm>
         </p:grpSpPr>
+        <p:sp>
+          <p:nvSpPr>
+            <p:cNvPr id="4" name="Rechteck: abgerundete Ecken 3">
+              <a:extLst>
+                <a:ext uri="{FF2B5EF4-FFF2-40B4-BE49-F238E27FC236}">
+                  <a16:creationId xmlns:a16="http://schemas.microsoft.com/office/drawing/2014/main" id="{108BCC32-8E67-493F-B3DA-B4E653222E68}"/>
+                </a:ext>
+              </a:extLst>
+            </p:cNvPr>
+            <p:cNvSpPr/>
+            <p:nvPr/>
+          </p:nvSpPr>
+          <p:spPr>
+            <a:xfrm>
+              <a:off x="4196421" y="4931727"/>
+              <a:ext cx="522900" cy="518160"/>
+            </a:xfrm>
+            <a:prstGeom prst="roundRect">
+              <a:avLst/>
+            </a:prstGeom>
+            <a:noFill/>
+            <a:ln>
+              <a:noFill/>
+            </a:ln>
+          </p:spPr>
+          <p:style>
+            <a:lnRef idx="2">
+              <a:schemeClr val="accent1">
+                <a:shade val="50000"/>
+              </a:schemeClr>
+            </a:lnRef>
+            <a:fillRef idx="1">
+              <a:schemeClr val="accent1"/>
+            </a:fillRef>
+            <a:effectRef idx="0">
+              <a:schemeClr val="accent1"/>
+            </a:effectRef>
+            <a:fontRef idx="minor">
+              <a:schemeClr val="lt1"/>
+            </a:fontRef>
+          </p:style>
+          <p:txBody>
+            <a:bodyPr rtlCol="0" anchor="ctr"/>
+            <a:lstStyle/>
+            <a:p>
+              <a:pPr algn="ctr"/>
+              <a:endParaRPr lang="en-US"/>
+            </a:p>
+          </p:txBody>
+        </p:sp>
         <p:pic>
           <p:nvPicPr>
-            <p:cNvPr id="11" name="Grafik 10">
+            <p:cNvPr id="76" name="Grafik 75">
               <a:extLst>
                 <a:ext uri="{FF2B5EF4-FFF2-40B4-BE49-F238E27FC236}">
-                  <a16:creationId xmlns:a16="http://schemas.microsoft.com/office/drawing/2014/main" id="{2ADA9C79-E7E9-4781-B0BF-251E63DDA6A4}"/>
+                  <a16:creationId xmlns:a16="http://schemas.microsoft.com/office/drawing/2014/main" id="{908BA496-CE45-42C6-B1B0-DB9413993FBA}"/>
                 </a:ext>
               </a:extLst>
             </p:cNvPr>
@@ -5647,7 +5733,7 @@
             <p:nvPr/>
           </p:nvPicPr>
           <p:blipFill>
-            <a:blip r:embed="rId17">
+            <a:blip r:embed="rId18">
               <a:clrChange>
                 <a:clrFrom>
                   <a:srgbClr val="FFFFFF"/>
@@ -5677,146 +5763,24 @@
           </p:blipFill>
           <p:spPr>
             <a:xfrm>
-              <a:off x="4996459" y="3908148"/>
+              <a:off x="4232295" y="4974475"/>
               <a:ext cx="433350" cy="435284"/>
             </a:xfrm>
             <a:prstGeom prst="rect">
               <a:avLst/>
             </a:prstGeom>
-          </p:spPr>
-        </p:pic>
-        <p:pic>
-          <p:nvPicPr>
-            <p:cNvPr id="223" name="Grafik 222">
-              <a:extLst>
-                <a:ext uri="{FF2B5EF4-FFF2-40B4-BE49-F238E27FC236}">
-                  <a16:creationId xmlns:a16="http://schemas.microsoft.com/office/drawing/2014/main" id="{D8C7703D-613B-40AB-BC04-9F8142B8F8DF}"/>
-                </a:ext>
-              </a:extLst>
-            </p:cNvPr>
-            <p:cNvPicPr>
-              <a:picLocks noChangeAspect="1"/>
-            </p:cNvPicPr>
-            <p:nvPr/>
-          </p:nvPicPr>
-          <p:blipFill rotWithShape="1">
-            <a:blip r:embed="rId14">
-              <a:duotone>
-                <a:schemeClr val="accent5">
-                  <a:shade val="45000"/>
-                  <a:satMod val="135000"/>
-                </a:schemeClr>
-                <a:prstClr val="white"/>
-              </a:duotone>
-              <a:extLst>
-                <a:ext uri="{28A0092B-C50C-407E-A947-70E740481C1C}">
-                  <a14:useLocalDpi xmlns:a14="http://schemas.microsoft.com/office/drawing/2010/main" val="0"/>
-                </a:ext>
-              </a:extLst>
-            </a:blip>
-            <a:srcRect l="16797" t="10394" r="16405" b="16625"/>
-            <a:stretch/>
-          </p:blipFill>
-          <p:spPr>
-            <a:xfrm>
-              <a:off x="5733246" y="4199320"/>
-              <a:ext cx="129534" cy="141523"/>
-            </a:xfrm>
-            <a:prstGeom prst="rect">
-              <a:avLst/>
-            </a:prstGeom>
-          </p:spPr>
-        </p:pic>
-        <p:pic>
-          <p:nvPicPr>
-            <p:cNvPr id="250" name="Grafik 249">
-              <a:extLst>
-                <a:ext uri="{FF2B5EF4-FFF2-40B4-BE49-F238E27FC236}">
-                  <a16:creationId xmlns:a16="http://schemas.microsoft.com/office/drawing/2014/main" id="{F16AE691-E4C7-48A9-958A-6DD9CB30070A}"/>
-                </a:ext>
-              </a:extLst>
-            </p:cNvPr>
-            <p:cNvPicPr>
-              <a:picLocks noChangeAspect="1"/>
-            </p:cNvPicPr>
-            <p:nvPr/>
-          </p:nvPicPr>
-          <p:blipFill rotWithShape="1">
-            <a:blip r:embed="rId14">
-              <a:duotone>
-                <a:schemeClr val="accent5">
-                  <a:shade val="45000"/>
-                  <a:satMod val="135000"/>
-                </a:schemeClr>
-                <a:prstClr val="white"/>
-              </a:duotone>
-              <a:extLst>
-                <a:ext uri="{28A0092B-C50C-407E-A947-70E740481C1C}">
-                  <a14:useLocalDpi xmlns:a14="http://schemas.microsoft.com/office/drawing/2010/main" val="0"/>
-                </a:ext>
-              </a:extLst>
-            </a:blip>
-            <a:srcRect l="16797" t="10394" r="16405" b="16625"/>
-            <a:stretch/>
-          </p:blipFill>
-          <p:spPr>
-            <a:xfrm>
-              <a:off x="5567745" y="4201909"/>
-              <a:ext cx="129534" cy="141523"/>
-            </a:xfrm>
-            <a:prstGeom prst="rect">
-              <a:avLst/>
-            </a:prstGeom>
-          </p:spPr>
-        </p:pic>
-        <p:pic>
-          <p:nvPicPr>
-            <p:cNvPr id="251" name="Grafik 250">
-              <a:extLst>
-                <a:ext uri="{FF2B5EF4-FFF2-40B4-BE49-F238E27FC236}">
-                  <a16:creationId xmlns:a16="http://schemas.microsoft.com/office/drawing/2014/main" id="{2D555DE6-AC93-4B67-B721-26CD26A8B154}"/>
-                </a:ext>
-              </a:extLst>
-            </p:cNvPr>
-            <p:cNvPicPr>
-              <a:picLocks noChangeAspect="1"/>
-            </p:cNvPicPr>
-            <p:nvPr/>
-          </p:nvPicPr>
-          <p:blipFill rotWithShape="1">
-            <a:blip r:embed="rId14">
-              <a:duotone>
-                <a:schemeClr val="accent5">
-                  <a:shade val="45000"/>
-                  <a:satMod val="135000"/>
-                </a:schemeClr>
-                <a:prstClr val="white"/>
-              </a:duotone>
-              <a:extLst>
-                <a:ext uri="{28A0092B-C50C-407E-A947-70E740481C1C}">
-                  <a14:useLocalDpi xmlns:a14="http://schemas.microsoft.com/office/drawing/2010/main" val="0"/>
-                </a:ext>
-              </a:extLst>
-            </a:blip>
-            <a:srcRect l="16797" t="10394" r="16405" b="16625"/>
-            <a:stretch/>
-          </p:blipFill>
-          <p:spPr>
-            <a:xfrm>
-              <a:off x="5402244" y="4201909"/>
-              <a:ext cx="129534" cy="141523"/>
-            </a:xfrm>
-            <a:prstGeom prst="rect">
-              <a:avLst/>
-            </a:prstGeom>
+            <a:noFill/>
+            <a:ln cap="rnd">
+              <a:noFill/>
+            </a:ln>
           </p:spPr>
         </p:pic>
         <p:sp>
           <p:nvSpPr>
-            <p:cNvPr id="259" name="Textfeld 258">
+            <p:cNvPr id="77" name="Textfeld 76">
               <a:extLst>
                 <a:ext uri="{FF2B5EF4-FFF2-40B4-BE49-F238E27FC236}">
-                  <a16:creationId xmlns:a16="http://schemas.microsoft.com/office/drawing/2014/main" id="{A3751D81-C76D-4845-8B74-57A700D2634A}"/>
+                  <a16:creationId xmlns:a16="http://schemas.microsoft.com/office/drawing/2014/main" id="{44F0848B-6762-40C0-A06A-0C17484B56D4}"/>
                 </a:ext>
               </a:extLst>
             </p:cNvPr>
@@ -5825,8 +5789,8 @@
           </p:nvSpPr>
           <p:spPr>
             <a:xfrm>
-              <a:off x="5036820" y="3935393"/>
-              <a:ext cx="1215397" cy="369332"/>
+              <a:off x="4266744" y="5006141"/>
+              <a:ext cx="291685" cy="369332"/>
             </a:xfrm>
             <a:prstGeom prst="rect">
               <a:avLst/>
@@ -5834,7 +5798,7 @@
             <a:noFill/>
           </p:spPr>
           <p:txBody>
-            <a:bodyPr wrap="none" rtlCol="0">
+            <a:bodyPr wrap="square" rtlCol="0">
               <a:spAutoFit/>
             </a:bodyPr>
             <a:lstStyle/>
@@ -5844,49 +5808,63 @@
                   <a:solidFill>
                     <a:schemeClr val="accent1"/>
                   </a:solidFill>
+                  <a:latin typeface="Arial" panose="020B0604020202020204" pitchFamily="34" charset="0"/>
+                  <a:cs typeface="Arial" panose="020B0604020202020204" pitchFamily="34" charset="0"/>
                 </a:rPr>
-                <a:t>G i s t o p s</a:t>
+                <a:t>G</a:t>
               </a:r>
             </a:p>
           </p:txBody>
         </p:sp>
+        <p:sp>
+          <p:nvSpPr>
+            <p:cNvPr id="80" name="Textfeld 79">
+              <a:extLst>
+                <a:ext uri="{FF2B5EF4-FFF2-40B4-BE49-F238E27FC236}">
+                  <a16:creationId xmlns:a16="http://schemas.microsoft.com/office/drawing/2014/main" id="{2D2F7DC1-EB89-4A96-8181-B3A9D0C8D75D}"/>
+                </a:ext>
+              </a:extLst>
+            </p:cNvPr>
+            <p:cNvSpPr txBox="1"/>
+            <p:nvPr/>
+          </p:nvSpPr>
+          <p:spPr>
+            <a:xfrm>
+              <a:off x="4412587" y="5295707"/>
+              <a:ext cx="370402" cy="169277"/>
+            </a:xfrm>
+            <a:prstGeom prst="rect">
+              <a:avLst/>
+            </a:prstGeom>
+            <a:noFill/>
+          </p:spPr>
+          <p:txBody>
+            <a:bodyPr wrap="square" rtlCol="0">
+              <a:spAutoFit/>
+            </a:bodyPr>
+            <a:lstStyle/>
+            <a:p>
+              <a:r>
+                <a:rPr lang="en-US" sz="500" b="1" dirty="0" err="1">
+                  <a:solidFill>
+                    <a:schemeClr val="accent1"/>
+                  </a:solidFill>
+                  <a:latin typeface="Arial" panose="020B0604020202020204" pitchFamily="34" charset="0"/>
+                  <a:cs typeface="Arial" panose="020B0604020202020204" pitchFamily="34" charset="0"/>
+                </a:rPr>
+                <a:t>istops</a:t>
+              </a:r>
+              <a:endParaRPr lang="en-US" sz="500" b="1" dirty="0">
+                <a:solidFill>
+                  <a:schemeClr val="accent1"/>
+                </a:solidFill>
+                <a:latin typeface="Arial" panose="020B0604020202020204" pitchFamily="34" charset="0"/>
+                <a:cs typeface="Arial" panose="020B0604020202020204" pitchFamily="34" charset="0"/>
+              </a:endParaRPr>
+            </a:p>
+          </p:txBody>
+        </p:sp>
       </p:grpSp>
-      <p:pic>
-        <p:nvPicPr>
-          <p:cNvPr id="269" name="Grafik 268">
-            <a:extLst>
-              <a:ext uri="{FF2B5EF4-FFF2-40B4-BE49-F238E27FC236}">
-                <a16:creationId xmlns:a16="http://schemas.microsoft.com/office/drawing/2014/main" id="{693A178B-4746-4B0A-9415-930C2D6F155F}"/>
-              </a:ext>
-            </a:extLst>
-          </p:cNvPr>
-          <p:cNvPicPr>
-            <a:picLocks noChangeAspect="1"/>
-          </p:cNvPicPr>
-          <p:nvPr/>
-        </p:nvPicPr>
-        <p:blipFill>
-          <a:blip r:embed="rId18">
-            <a:extLst>
-              <a:ext uri="{28A0092B-C50C-407E-A947-70E740481C1C}">
-                <a14:useLocalDpi xmlns:a14="http://schemas.microsoft.com/office/drawing/2010/main" val="0"/>
-              </a:ext>
-            </a:extLst>
-          </a:blip>
-          <a:stretch>
-            <a:fillRect/>
-          </a:stretch>
-        </p:blipFill>
-        <p:spPr>
-          <a:xfrm>
-            <a:off x="8525248" y="2238965"/>
-            <a:ext cx="266796" cy="266796"/>
-          </a:xfrm>
-          <a:prstGeom prst="rect">
-            <a:avLst/>
-          </a:prstGeom>
-        </p:spPr>
-      </p:pic>
     </p:spTree>
     <p:extLst>
       <p:ext uri="{BB962C8B-B14F-4D97-AF65-F5344CB8AC3E}">

</xml_diff>